<commit_message>
add design pattern v4
</commit_message>
<xml_diff>
--- a/Design_Pattern_v4.pptx
+++ b/Design_Pattern_v4.pptx
@@ -302,7 +302,7 @@
               <a:pPr>
                 <a:defRPr/>
               </a:pPr>
-              <a:t>2023-09-06</a:t>
+              <a:t>2023-09-08</a:t>
             </a:fld>
             <a:endParaRPr lang="ko-KR" altLang="en-US" dirty="0"/>
           </a:p>
@@ -504,7 +504,7 @@
               <a:pPr>
                 <a:defRPr/>
               </a:pPr>
-              <a:t>2023-09-06</a:t>
+              <a:t>2023-09-08</a:t>
             </a:fld>
             <a:endParaRPr lang="ko-KR" altLang="en-US" dirty="0"/>
           </a:p>
@@ -7794,15 +7794,7 @@
                 <a:ea typeface="LG스마트체 Regular" panose="020B0600000101010101" pitchFamily="50" charset="-127"/>
                 <a:cs typeface="Arial" pitchFamily="34" charset="0"/>
               </a:rPr>
-              <a:t>. </a:t>
-            </a:r>
-            <a:r>
-              <a:rPr lang="en-US" altLang="ko-KR" b="1" dirty="0" smtClean="0">
-                <a:latin typeface="Arial Narrow" panose="020B0606020202030204" pitchFamily="34" charset="0"/>
-                <a:ea typeface="LG스마트체 Regular" panose="020B0600000101010101" pitchFamily="50" charset="-127"/>
-                <a:cs typeface="Arial" pitchFamily="34" charset="0"/>
-              </a:rPr>
-              <a:t>Applicability </a:t>
+              <a:t>. Applicability </a:t>
             </a:r>
             <a:endParaRPr lang="ko-KR" altLang="en-US" b="1" dirty="0">
               <a:latin typeface="Arial Narrow" panose="020B0606020202030204" pitchFamily="34" charset="0"/>
@@ -8044,15 +8036,7 @@
                 <a:ea typeface="LG스마트체 Regular" panose="020B0600000101010101" pitchFamily="50" charset="-127"/>
                 <a:cs typeface="Arial" pitchFamily="34" charset="0"/>
               </a:rPr>
-              <a:t>. </a:t>
-            </a:r>
-            <a:r>
-              <a:rPr lang="en-US" altLang="ko-KR" b="1" dirty="0" smtClean="0">
-                <a:latin typeface="Arial Narrow" panose="020B0606020202030204" pitchFamily="34" charset="0"/>
-                <a:ea typeface="LG스마트체 Regular" panose="020B0600000101010101" pitchFamily="50" charset="-127"/>
-                <a:cs typeface="Arial" pitchFamily="34" charset="0"/>
-              </a:rPr>
-              <a:t>Props and Cons</a:t>
+              <a:t>. Props and Cons</a:t>
             </a:r>
             <a:endParaRPr lang="ko-KR" altLang="en-US" b="1" dirty="0">
               <a:latin typeface="Arial Narrow" panose="020B0606020202030204" pitchFamily="34" charset="0"/>
@@ -8691,7 +8675,7 @@
           <p:cNvPr id="1026" name="Picture 2">
             <a:extLst>
               <a:ext uri="{FF2B5EF4-FFF2-40B4-BE49-F238E27FC236}">
-                <a16:creationId xmlns:a16="http://schemas.microsoft.com/office/drawing/2014/main" xmlns="" id="{6B9BCD5F-8A34-BBCC-679D-D0668C821C21}"/>
+                <a16:creationId xmlns="" xmlns:a16="http://schemas.microsoft.com/office/drawing/2014/main" id="{6B9BCD5F-8A34-BBCC-679D-D0668C821C21}"/>
               </a:ext>
             </a:extLst>
           </p:cNvPr>
@@ -8875,7 +8859,7 @@
           <p:cNvPr id="2050" name="Picture 2" descr="Magazine and newspaper subscriptions">
             <a:extLst>
               <a:ext uri="{FF2B5EF4-FFF2-40B4-BE49-F238E27FC236}">
-                <a16:creationId xmlns:a16="http://schemas.microsoft.com/office/drawing/2014/main" xmlns="" id="{2CB52CD9-464B-FDDA-3B6A-09ED2AFCEE1C}"/>
+                <a16:creationId xmlns="" xmlns:a16="http://schemas.microsoft.com/office/drawing/2014/main" id="{2CB52CD9-464B-FDDA-3B6A-09ED2AFCEE1C}"/>
               </a:ext>
             </a:extLst>
           </p:cNvPr>

</xml_diff>